<commit_message>
Fix intersecting lines in robustness diagrams - clean left-to-right layout
</commit_message>
<xml_diff>
--- a/Analysis/F1_Robustness_Analysis.pptx
+++ b/Analysis/F1_Robustness_Analysis.pptx
@@ -3321,7 +3321,7 @@
         <p:spPr>
           <a:xfrm>
             <a:off x="457200" y="1371600"/>
-            <a:ext cx="47986950" cy="5029200"/>
+            <a:ext cx="16020435" cy="5029200"/>
           </a:xfrm>
           <a:prstGeom prst="rect">
             <a:avLst/>
@@ -3384,7 +3384,7 @@
         <p:spPr>
           <a:xfrm>
             <a:off x="457200" y="1371600"/>
-            <a:ext cx="28879467" cy="5029200"/>
+            <a:ext cx="28107640" cy="5029200"/>
           </a:xfrm>
           <a:prstGeom prst="rect">
             <a:avLst/>
@@ -3447,7 +3447,7 @@
         <p:spPr>
           <a:xfrm>
             <a:off x="457200" y="1371600"/>
-            <a:ext cx="37756162" cy="5029200"/>
+            <a:ext cx="22124656" cy="5029200"/>
           </a:xfrm>
           <a:prstGeom prst="rect">
             <a:avLst/>
@@ -3510,7 +3510,7 @@
         <p:spPr>
           <a:xfrm>
             <a:off x="457200" y="1371600"/>
-            <a:ext cx="34361945" cy="5029200"/>
+            <a:ext cx="19982943" cy="5029200"/>
           </a:xfrm>
           <a:prstGeom prst="rect">
             <a:avLst/>
@@ -3573,7 +3573,7 @@
         <p:spPr>
           <a:xfrm>
             <a:off x="457200" y="1371600"/>
-            <a:ext cx="34974640" cy="5029200"/>
+            <a:ext cx="18463603" cy="5029200"/>
           </a:xfrm>
           <a:prstGeom prst="rect">
             <a:avLst/>

</xml_diff>